<commit_message>
slight change to subtitle formation
</commit_message>
<xml_diff>
--- a/TestProject2/test_ppt2_finalcopy.pptx
+++ b/TestProject2/test_ppt2_finalcopy.pptx
@@ -3129,7 +3129,7 @@
           <a:lstStyle/>
           <a:p>
             <a:r>
-              <a:t>Structured Streaming Method</a:t>
+              <a:t>Structured Streaming Method #1</a:t>
             </a:r>
           </a:p>
         </p:txBody>
@@ -3474,7 +3474,7 @@
           <a:lstStyle/>
           <a:p>
             <a:r>
-              <a:t>Structured Streaming Method</a:t>
+              <a:t>Structured Streaming Method #2</a:t>
             </a:r>
           </a:p>
         </p:txBody>
@@ -3819,7 +3819,7 @@
           <a:lstStyle/>
           <a:p>
             <a:r>
-              <a:t>Structured Streaming Method</a:t>
+              <a:t>Structured Streaming Method #3</a:t>
             </a:r>
           </a:p>
         </p:txBody>

</xml_diff>